<commit_message>
zapomnialem o jednej osobie
</commit_message>
<xml_diff>
--- a/Dokumentacja/Prototyp interfejsu/CosplayBook.pptx
+++ b/Dokumentacja/Prototyp interfejsu/CosplayBook.pptx
@@ -3836,7 +3836,15 @@
             </a:pPr>
             <a:r>
               <a:rPr lang="pl-PL" sz="1600" dirty="0"/>
-              <a:t>W zespole mamy 4 osoby, praca zostanie podzielona następująco:</a:t>
+              <a:t>W zespole mamy </a:t>
+            </a:r>
+            <a:r>
+              <a:rPr lang="pl-PL" sz="1600" dirty="0" smtClean="0"/>
+              <a:t>5 osób, </a:t>
+            </a:r>
+            <a:r>
+              <a:rPr lang="pl-PL" sz="1600" dirty="0"/>
+              <a:t>praca zostanie podzielona następująco:</a:t>
             </a:r>
           </a:p>
           <a:p>
@@ -3866,13 +3874,17 @@
             </a:pPr>
             <a:r>
               <a:rPr lang="pl-PL" sz="1600" dirty="0"/>
-              <a:t>Osoba 3 – Implementacjia serwisów RESTowych, w których występuje przesyłanie lub odbieranie zdjęć. (Wymagana duża współpraca </a:t>
+              <a:t>Osoba 3 </a:t>
             </a:r>
             <a:r>
               <a:rPr lang="pl-PL" sz="1600" dirty="0" smtClean="0"/>
-              <a:t>ze mną)</a:t>
-            </a:r>
-            <a:endParaRPr lang="pl-PL" sz="1600" dirty="0"/>
+              <a:t>+ 4 – </a:t>
+            </a:r>
+            <a:r>
+              <a:rPr lang="pl-PL" sz="1600" dirty="0"/>
+              <a:t>Implementacjia serwisów RESTowych, w których występuje przesyłanie lub odbieranie zdjęć. </a:t>
+            </a:r>
+            <a:endParaRPr lang="pl-PL" sz="1600" dirty="0" smtClean="0"/>
           </a:p>
           <a:p>
             <a:pPr marL="457200" indent="-457200">
@@ -3880,8 +3892,12 @@
               <a:buAutoNum type="arabicPeriod"/>
             </a:pPr>
             <a:r>
+              <a:rPr lang="pl-PL" sz="1600" dirty="0" smtClean="0"/>
+              <a:t>Osoba 5  </a:t>
+            </a:r>
+            <a:r>
               <a:rPr lang="pl-PL" sz="1600" dirty="0"/>
-              <a:t> Osoba 4 – Pozostałe serwisy RESTowe + bycie głównym testerem systemu</a:t>
+              <a:t>– Pozostałe serwisy RESTowe + bycie głównym testerem systemu</a:t>
             </a:r>
           </a:p>
           <a:p>

</xml_diff>